<commit_message>
original design doc level design issues
</commit_message>
<xml_diff>
--- a/level design issues.pptx
+++ b/level design issues.pptx
@@ -7,8 +7,7 @@
   <p:sldIdLst>
     <p:sldId id="256" r:id="rId2"/>
     <p:sldId id="257" r:id="rId3"/>
-    <p:sldId id="259" r:id="rId4"/>
-    <p:sldId id="258" r:id="rId5"/>
+    <p:sldId id="258" r:id="rId4"/>
   </p:sldIdLst>
   <p:sldSz cx="12192000" cy="6858000"/>
   <p:notesSz cx="6858000" cy="9144000"/>
@@ -107,6 +106,11 @@
       </a:defRPr>
     </a:lvl9pPr>
   </p:defaultTextStyle>
+  <p:extLst>
+    <p:ext uri="{EFAFB233-063F-42B5-8137-9DF3F51BA10A}">
+      <p15:sldGuideLst xmlns:p15="http://schemas.microsoft.com/office/powerpoint/2012/main"/>
+    </p:ext>
+  </p:extLst>
 </p:presentation>
 </file>
 
@@ -3021,7 +3025,7 @@
         </p:blipFill>
         <p:spPr>
           <a:xfrm>
-            <a:off x="2228144" y="1825625"/>
+            <a:off x="796162" y="1825625"/>
             <a:ext cx="7735712" cy="4351338"/>
           </a:xfrm>
           <a:prstGeom prst="rect">
@@ -3037,7 +3041,7 @@
         </p:nvSpPr>
         <p:spPr>
           <a:xfrm>
-            <a:off x="2548128" y="5097080"/>
+            <a:off x="1116146" y="5097080"/>
             <a:ext cx="1706880" cy="316167"/>
           </a:xfrm>
           <a:prstGeom prst="rect">
@@ -3081,7 +3085,7 @@
         </p:nvSpPr>
         <p:spPr>
           <a:xfrm>
-            <a:off x="4785360" y="5097081"/>
+            <a:off x="3353378" y="5097081"/>
             <a:ext cx="835152" cy="316167"/>
           </a:xfrm>
           <a:prstGeom prst="rect">
@@ -3117,6 +3121,366 @@
           </a:p>
         </p:txBody>
       </p:sp>
+      <p:grpSp>
+        <p:nvGrpSpPr>
+          <p:cNvPr id="6" name="Group 5"/>
+          <p:cNvGrpSpPr/>
+          <p:nvPr/>
+        </p:nvGrpSpPr>
+        <p:grpSpPr>
+          <a:xfrm>
+            <a:off x="8851396" y="2944955"/>
+            <a:ext cx="3062082" cy="1537923"/>
+            <a:chOff x="8497713" y="1875279"/>
+            <a:chExt cx="3062082" cy="1537923"/>
+          </a:xfrm>
+        </p:grpSpPr>
+        <p:grpSp>
+          <p:nvGrpSpPr>
+            <p:cNvPr id="7" name="Group 6"/>
+            <p:cNvGrpSpPr/>
+            <p:nvPr/>
+          </p:nvGrpSpPr>
+          <p:grpSpPr>
+            <a:xfrm>
+              <a:off x="8497713" y="2053542"/>
+              <a:ext cx="3062082" cy="1359660"/>
+              <a:chOff x="-17091" y="1452791"/>
+              <a:chExt cx="12192000" cy="5413630"/>
+            </a:xfrm>
+          </p:grpSpPr>
+          <p:cxnSp>
+            <p:nvCxnSpPr>
+              <p:cNvPr id="13" name="Straight Connector 12"/>
+              <p:cNvCxnSpPr/>
+              <p:nvPr/>
+            </p:nvCxnSpPr>
+            <p:spPr>
+              <a:xfrm flipH="1">
+                <a:off x="-17091" y="3639408"/>
+                <a:ext cx="12192000" cy="0"/>
+              </a:xfrm>
+              <a:prstGeom prst="line">
+                <a:avLst/>
+              </a:prstGeom>
+            </p:spPr>
+            <p:style>
+              <a:lnRef idx="1">
+                <a:schemeClr val="accent1"/>
+              </a:lnRef>
+              <a:fillRef idx="0">
+                <a:schemeClr val="accent1"/>
+              </a:fillRef>
+              <a:effectRef idx="0">
+                <a:schemeClr val="accent1"/>
+              </a:effectRef>
+              <a:fontRef idx="minor">
+                <a:schemeClr val="tx1"/>
+              </a:fontRef>
+            </p:style>
+          </p:cxnSp>
+          <p:cxnSp>
+            <p:nvCxnSpPr>
+              <p:cNvPr id="14" name="Straight Connector 13"/>
+              <p:cNvCxnSpPr/>
+              <p:nvPr/>
+            </p:nvCxnSpPr>
+            <p:spPr>
+              <a:xfrm flipH="1">
+                <a:off x="-17091" y="1452791"/>
+                <a:ext cx="12192000" cy="0"/>
+              </a:xfrm>
+              <a:prstGeom prst="line">
+                <a:avLst/>
+              </a:prstGeom>
+            </p:spPr>
+            <p:style>
+              <a:lnRef idx="1">
+                <a:schemeClr val="accent1"/>
+              </a:lnRef>
+              <a:fillRef idx="0">
+                <a:schemeClr val="accent1"/>
+              </a:fillRef>
+              <a:effectRef idx="0">
+                <a:schemeClr val="accent1"/>
+              </a:effectRef>
+              <a:fontRef idx="minor">
+                <a:schemeClr val="tx1"/>
+              </a:fontRef>
+            </p:style>
+          </p:cxnSp>
+          <p:cxnSp>
+            <p:nvCxnSpPr>
+              <p:cNvPr id="15" name="Straight Connector 14"/>
+              <p:cNvCxnSpPr/>
+              <p:nvPr/>
+            </p:nvCxnSpPr>
+            <p:spPr>
+              <a:xfrm flipH="1">
+                <a:off x="-17091" y="2521518"/>
+                <a:ext cx="12192000" cy="0"/>
+              </a:xfrm>
+              <a:prstGeom prst="line">
+                <a:avLst/>
+              </a:prstGeom>
+            </p:spPr>
+            <p:style>
+              <a:lnRef idx="1">
+                <a:schemeClr val="accent1"/>
+              </a:lnRef>
+              <a:fillRef idx="0">
+                <a:schemeClr val="accent1"/>
+              </a:fillRef>
+              <a:effectRef idx="0">
+                <a:schemeClr val="accent1"/>
+              </a:effectRef>
+              <a:fontRef idx="minor">
+                <a:schemeClr val="tx1"/>
+              </a:fontRef>
+            </p:style>
+          </p:cxnSp>
+          <p:cxnSp>
+            <p:nvCxnSpPr>
+              <p:cNvPr id="16" name="Straight Connector 15"/>
+              <p:cNvCxnSpPr/>
+              <p:nvPr/>
+            </p:nvCxnSpPr>
+            <p:spPr>
+              <a:xfrm flipH="1">
+                <a:off x="-17091" y="4973836"/>
+                <a:ext cx="12192000" cy="0"/>
+              </a:xfrm>
+              <a:prstGeom prst="line">
+                <a:avLst/>
+              </a:prstGeom>
+            </p:spPr>
+            <p:style>
+              <a:lnRef idx="1">
+                <a:schemeClr val="accent1"/>
+              </a:lnRef>
+              <a:fillRef idx="0">
+                <a:schemeClr val="accent1"/>
+              </a:fillRef>
+              <a:effectRef idx="0">
+                <a:schemeClr val="accent1"/>
+              </a:effectRef>
+              <a:fontRef idx="minor">
+                <a:schemeClr val="tx1"/>
+              </a:fontRef>
+            </p:style>
+          </p:cxnSp>
+          <p:cxnSp>
+            <p:nvCxnSpPr>
+              <p:cNvPr id="17" name="Straight Connector 16"/>
+              <p:cNvCxnSpPr/>
+              <p:nvPr/>
+            </p:nvCxnSpPr>
+            <p:spPr>
+              <a:xfrm flipH="1">
+                <a:off x="-17091" y="5986328"/>
+                <a:ext cx="12192000" cy="0"/>
+              </a:xfrm>
+              <a:prstGeom prst="line">
+                <a:avLst/>
+              </a:prstGeom>
+            </p:spPr>
+            <p:style>
+              <a:lnRef idx="1">
+                <a:schemeClr val="accent1"/>
+              </a:lnRef>
+              <a:fillRef idx="0">
+                <a:schemeClr val="accent1"/>
+              </a:fillRef>
+              <a:effectRef idx="0">
+                <a:schemeClr val="accent1"/>
+              </a:effectRef>
+              <a:fontRef idx="minor">
+                <a:schemeClr val="tx1"/>
+              </a:fontRef>
+            </p:style>
+          </p:cxnSp>
+          <p:sp>
+            <p:nvSpPr>
+              <p:cNvPr id="18" name="Oval 17"/>
+              <p:cNvSpPr/>
+              <p:nvPr/>
+            </p:nvSpPr>
+            <p:spPr>
+              <a:xfrm>
+                <a:off x="2246654" y="5106233"/>
+                <a:ext cx="636675" cy="1760188"/>
+              </a:xfrm>
+              <a:prstGeom prst="ellipse">
+                <a:avLst/>
+              </a:prstGeom>
+            </p:spPr>
+            <p:style>
+              <a:lnRef idx="2">
+                <a:schemeClr val="accent2">
+                  <a:shade val="50000"/>
+                </a:schemeClr>
+              </a:lnRef>
+              <a:fillRef idx="1">
+                <a:schemeClr val="accent2"/>
+              </a:fillRef>
+              <a:effectRef idx="0">
+                <a:schemeClr val="accent2"/>
+              </a:effectRef>
+              <a:fontRef idx="minor">
+                <a:schemeClr val="lt1"/>
+              </a:fontRef>
+            </p:style>
+            <p:txBody>
+              <a:bodyPr rtlCol="1" anchor="ctr"/>
+              <a:lstStyle/>
+              <a:p>
+                <a:pPr algn="ctr"/>
+                <a:endParaRPr lang="he-IL"/>
+              </a:p>
+            </p:txBody>
+          </p:sp>
+          <p:sp>
+            <p:nvSpPr>
+              <p:cNvPr id="19" name="Oval 18"/>
+              <p:cNvSpPr/>
+              <p:nvPr/>
+            </p:nvSpPr>
+            <p:spPr>
+              <a:xfrm>
+                <a:off x="7999862" y="3350810"/>
+                <a:ext cx="1273321" cy="640935"/>
+              </a:xfrm>
+              <a:prstGeom prst="ellipse">
+                <a:avLst/>
+              </a:prstGeom>
+            </p:spPr>
+            <p:style>
+              <a:lnRef idx="2">
+                <a:schemeClr val="accent6">
+                  <a:shade val="50000"/>
+                </a:schemeClr>
+              </a:lnRef>
+              <a:fillRef idx="1">
+                <a:schemeClr val="accent6"/>
+              </a:fillRef>
+              <a:effectRef idx="0">
+                <a:schemeClr val="accent6"/>
+              </a:effectRef>
+              <a:fontRef idx="minor">
+                <a:schemeClr val="lt1"/>
+              </a:fontRef>
+            </p:style>
+            <p:txBody>
+              <a:bodyPr rtlCol="1" anchor="ctr"/>
+              <a:lstStyle/>
+              <a:p>
+                <a:pPr algn="ctr"/>
+                <a:endParaRPr lang="he-IL" sz="4800" dirty="0"/>
+              </a:p>
+            </p:txBody>
+          </p:sp>
+          <p:sp>
+            <p:nvSpPr>
+              <p:cNvPr id="20" name="Oval 19"/>
+              <p:cNvSpPr/>
+              <p:nvPr/>
+            </p:nvSpPr>
+            <p:spPr>
+              <a:xfrm>
+                <a:off x="4836772" y="5665859"/>
+                <a:ext cx="1273321" cy="640935"/>
+              </a:xfrm>
+              <a:prstGeom prst="ellipse">
+                <a:avLst/>
+              </a:prstGeom>
+            </p:spPr>
+            <p:style>
+              <a:lnRef idx="2">
+                <a:schemeClr val="accent4">
+                  <a:shade val="50000"/>
+                </a:schemeClr>
+              </a:lnRef>
+              <a:fillRef idx="1">
+                <a:schemeClr val="accent4"/>
+              </a:fillRef>
+              <a:effectRef idx="0">
+                <a:schemeClr val="accent4"/>
+              </a:effectRef>
+              <a:fontRef idx="minor">
+                <a:schemeClr val="lt1"/>
+              </a:fontRef>
+            </p:style>
+            <p:txBody>
+              <a:bodyPr rtlCol="1" anchor="ctr"/>
+              <a:lstStyle/>
+              <a:p>
+                <a:pPr algn="ctr"/>
+                <a:endParaRPr lang="he-IL" sz="4800" dirty="0"/>
+              </a:p>
+            </p:txBody>
+          </p:sp>
+        </p:grpSp>
+        <p:cxnSp>
+          <p:nvCxnSpPr>
+            <p:cNvPr id="11" name="Straight Connector 10"/>
+            <p:cNvCxnSpPr/>
+            <p:nvPr/>
+          </p:nvCxnSpPr>
+          <p:spPr>
+            <a:xfrm>
+              <a:off x="8610600" y="1875279"/>
+              <a:ext cx="0" cy="1454885"/>
+            </a:xfrm>
+            <a:prstGeom prst="line">
+              <a:avLst/>
+            </a:prstGeom>
+          </p:spPr>
+          <p:style>
+            <a:lnRef idx="1">
+              <a:schemeClr val="dk1"/>
+            </a:lnRef>
+            <a:fillRef idx="0">
+              <a:schemeClr val="dk1"/>
+            </a:fillRef>
+            <a:effectRef idx="0">
+              <a:schemeClr val="dk1"/>
+            </a:effectRef>
+            <a:fontRef idx="minor">
+              <a:schemeClr val="tx1"/>
+            </a:fontRef>
+          </p:style>
+        </p:cxnSp>
+        <p:cxnSp>
+          <p:nvCxnSpPr>
+            <p:cNvPr id="12" name="Straight Connector 11"/>
+            <p:cNvCxnSpPr/>
+            <p:nvPr/>
+          </p:nvCxnSpPr>
+          <p:spPr>
+            <a:xfrm>
+              <a:off x="11546768" y="1876810"/>
+              <a:ext cx="0" cy="1454885"/>
+            </a:xfrm>
+            <a:prstGeom prst="line">
+              <a:avLst/>
+            </a:prstGeom>
+          </p:spPr>
+          <p:style>
+            <a:lnRef idx="1">
+              <a:schemeClr val="dk1"/>
+            </a:lnRef>
+            <a:fillRef idx="0">
+              <a:schemeClr val="dk1"/>
+            </a:fillRef>
+            <a:effectRef idx="0">
+              <a:schemeClr val="dk1"/>
+            </a:effectRef>
+            <a:fontRef idx="minor">
+              <a:schemeClr val="tx1"/>
+            </a:fontRef>
+          </p:style>
+        </p:cxnSp>
+      </p:grpSp>
     </p:spTree>
     <p:extLst>
       <p:ext uri="{BB962C8B-B14F-4D97-AF65-F5344CB8AC3E}">
@@ -3203,7 +3567,7 @@
         </p:blipFill>
         <p:spPr>
           <a:xfrm>
-            <a:off x="2228144" y="1825625"/>
+            <a:off x="838200" y="1903263"/>
             <a:ext cx="7735712" cy="4351338"/>
           </a:xfrm>
           <a:prstGeom prst="rect">
@@ -3219,7 +3583,7 @@
         </p:nvSpPr>
         <p:spPr>
           <a:xfrm>
-            <a:off x="3133344" y="3843211"/>
+            <a:off x="1743400" y="3920849"/>
             <a:ext cx="2401824" cy="289878"/>
           </a:xfrm>
           <a:prstGeom prst="rect">
@@ -3255,6 +3619,326 @@
           </a:p>
         </p:txBody>
       </p:sp>
+      <p:grpSp>
+        <p:nvGrpSpPr>
+          <p:cNvPr id="5" name="Group 4"/>
+          <p:cNvGrpSpPr/>
+          <p:nvPr/>
+        </p:nvGrpSpPr>
+        <p:grpSpPr>
+          <a:xfrm>
+            <a:off x="8841274" y="3350724"/>
+            <a:ext cx="3062082" cy="1456416"/>
+            <a:chOff x="4653904" y="1925836"/>
+            <a:chExt cx="3062082" cy="1456416"/>
+          </a:xfrm>
+        </p:grpSpPr>
+        <p:grpSp>
+          <p:nvGrpSpPr>
+            <p:cNvPr id="8" name="Group 7"/>
+            <p:cNvGrpSpPr/>
+            <p:nvPr/>
+          </p:nvGrpSpPr>
+          <p:grpSpPr>
+            <a:xfrm>
+              <a:off x="4653904" y="2053542"/>
+              <a:ext cx="3062082" cy="1138620"/>
+              <a:chOff x="-17091" y="1452791"/>
+              <a:chExt cx="12192000" cy="4533537"/>
+            </a:xfrm>
+          </p:grpSpPr>
+          <p:cxnSp>
+            <p:nvCxnSpPr>
+              <p:cNvPr id="11" name="Straight Connector 10"/>
+              <p:cNvCxnSpPr/>
+              <p:nvPr/>
+            </p:nvCxnSpPr>
+            <p:spPr>
+              <a:xfrm flipH="1">
+                <a:off x="-17091" y="3639408"/>
+                <a:ext cx="12192000" cy="0"/>
+              </a:xfrm>
+              <a:prstGeom prst="line">
+                <a:avLst/>
+              </a:prstGeom>
+            </p:spPr>
+            <p:style>
+              <a:lnRef idx="1">
+                <a:schemeClr val="accent1"/>
+              </a:lnRef>
+              <a:fillRef idx="0">
+                <a:schemeClr val="accent1"/>
+              </a:fillRef>
+              <a:effectRef idx="0">
+                <a:schemeClr val="accent1"/>
+              </a:effectRef>
+              <a:fontRef idx="minor">
+                <a:schemeClr val="tx1"/>
+              </a:fontRef>
+            </p:style>
+          </p:cxnSp>
+          <p:cxnSp>
+            <p:nvCxnSpPr>
+              <p:cNvPr id="12" name="Straight Connector 11"/>
+              <p:cNvCxnSpPr/>
+              <p:nvPr/>
+            </p:nvCxnSpPr>
+            <p:spPr>
+              <a:xfrm flipH="1">
+                <a:off x="-17091" y="1452791"/>
+                <a:ext cx="12192000" cy="0"/>
+              </a:xfrm>
+              <a:prstGeom prst="line">
+                <a:avLst/>
+              </a:prstGeom>
+            </p:spPr>
+            <p:style>
+              <a:lnRef idx="1">
+                <a:schemeClr val="accent1"/>
+              </a:lnRef>
+              <a:fillRef idx="0">
+                <a:schemeClr val="accent1"/>
+              </a:fillRef>
+              <a:effectRef idx="0">
+                <a:schemeClr val="accent1"/>
+              </a:effectRef>
+              <a:fontRef idx="minor">
+                <a:schemeClr val="tx1"/>
+              </a:fontRef>
+            </p:style>
+          </p:cxnSp>
+          <p:cxnSp>
+            <p:nvCxnSpPr>
+              <p:cNvPr id="13" name="Straight Connector 12"/>
+              <p:cNvCxnSpPr/>
+              <p:nvPr/>
+            </p:nvCxnSpPr>
+            <p:spPr>
+              <a:xfrm flipH="1">
+                <a:off x="-17091" y="2521518"/>
+                <a:ext cx="12192000" cy="0"/>
+              </a:xfrm>
+              <a:prstGeom prst="line">
+                <a:avLst/>
+              </a:prstGeom>
+            </p:spPr>
+            <p:style>
+              <a:lnRef idx="1">
+                <a:schemeClr val="accent1"/>
+              </a:lnRef>
+              <a:fillRef idx="0">
+                <a:schemeClr val="accent1"/>
+              </a:fillRef>
+              <a:effectRef idx="0">
+                <a:schemeClr val="accent1"/>
+              </a:effectRef>
+              <a:fontRef idx="minor">
+                <a:schemeClr val="tx1"/>
+              </a:fontRef>
+            </p:style>
+          </p:cxnSp>
+          <p:cxnSp>
+            <p:nvCxnSpPr>
+              <p:cNvPr id="14" name="Straight Connector 13"/>
+              <p:cNvCxnSpPr/>
+              <p:nvPr/>
+            </p:nvCxnSpPr>
+            <p:spPr>
+              <a:xfrm flipH="1">
+                <a:off x="-17091" y="4931501"/>
+                <a:ext cx="12192000" cy="0"/>
+              </a:xfrm>
+              <a:prstGeom prst="line">
+                <a:avLst/>
+              </a:prstGeom>
+            </p:spPr>
+            <p:style>
+              <a:lnRef idx="1">
+                <a:schemeClr val="accent1"/>
+              </a:lnRef>
+              <a:fillRef idx="0">
+                <a:schemeClr val="accent1"/>
+              </a:fillRef>
+              <a:effectRef idx="0">
+                <a:schemeClr val="accent1"/>
+              </a:effectRef>
+              <a:fontRef idx="minor">
+                <a:schemeClr val="tx1"/>
+              </a:fontRef>
+            </p:style>
+          </p:cxnSp>
+          <p:cxnSp>
+            <p:nvCxnSpPr>
+              <p:cNvPr id="15" name="Straight Connector 14"/>
+              <p:cNvCxnSpPr/>
+              <p:nvPr/>
+            </p:nvCxnSpPr>
+            <p:spPr>
+              <a:xfrm flipH="1">
+                <a:off x="-17091" y="5986328"/>
+                <a:ext cx="12192000" cy="0"/>
+              </a:xfrm>
+              <a:prstGeom prst="line">
+                <a:avLst/>
+              </a:prstGeom>
+            </p:spPr>
+            <p:style>
+              <a:lnRef idx="1">
+                <a:schemeClr val="accent1"/>
+              </a:lnRef>
+              <a:fillRef idx="0">
+                <a:schemeClr val="accent1"/>
+              </a:fillRef>
+              <a:effectRef idx="0">
+                <a:schemeClr val="accent1"/>
+              </a:effectRef>
+              <a:fontRef idx="minor">
+                <a:schemeClr val="tx1"/>
+              </a:fontRef>
+            </p:style>
+          </p:cxnSp>
+          <p:sp>
+            <p:nvSpPr>
+              <p:cNvPr id="16" name="Oval 15"/>
+              <p:cNvSpPr/>
+              <p:nvPr/>
+            </p:nvSpPr>
+            <p:spPr>
+              <a:xfrm>
+                <a:off x="2358008" y="2201050"/>
+                <a:ext cx="1273321" cy="640935"/>
+              </a:xfrm>
+              <a:prstGeom prst="ellipse">
+                <a:avLst/>
+              </a:prstGeom>
+            </p:spPr>
+            <p:style>
+              <a:lnRef idx="2">
+                <a:schemeClr val="accent6">
+                  <a:shade val="50000"/>
+                </a:schemeClr>
+              </a:lnRef>
+              <a:fillRef idx="1">
+                <a:schemeClr val="accent6"/>
+              </a:fillRef>
+              <a:effectRef idx="0">
+                <a:schemeClr val="accent6"/>
+              </a:effectRef>
+              <a:fontRef idx="minor">
+                <a:schemeClr val="lt1"/>
+              </a:fontRef>
+            </p:style>
+            <p:txBody>
+              <a:bodyPr rtlCol="1" anchor="ctr"/>
+              <a:lstStyle/>
+              <a:p>
+                <a:pPr algn="ctr"/>
+                <a:endParaRPr lang="he-IL" sz="4800" dirty="0"/>
+              </a:p>
+            </p:txBody>
+          </p:sp>
+          <p:sp>
+            <p:nvSpPr>
+              <p:cNvPr id="17" name="Oval 16"/>
+              <p:cNvSpPr/>
+              <p:nvPr/>
+            </p:nvSpPr>
+            <p:spPr>
+              <a:xfrm>
+                <a:off x="9910515" y="3311393"/>
+                <a:ext cx="1273321" cy="640935"/>
+              </a:xfrm>
+              <a:prstGeom prst="ellipse">
+                <a:avLst/>
+              </a:prstGeom>
+            </p:spPr>
+            <p:style>
+              <a:lnRef idx="2">
+                <a:schemeClr val="accent6">
+                  <a:shade val="50000"/>
+                </a:schemeClr>
+              </a:lnRef>
+              <a:fillRef idx="1">
+                <a:schemeClr val="accent6"/>
+              </a:fillRef>
+              <a:effectRef idx="0">
+                <a:schemeClr val="accent6"/>
+              </a:effectRef>
+              <a:fontRef idx="minor">
+                <a:schemeClr val="lt1"/>
+              </a:fontRef>
+            </p:style>
+            <p:txBody>
+              <a:bodyPr rtlCol="1" anchor="ctr"/>
+              <a:lstStyle/>
+              <a:p>
+                <a:pPr algn="ctr"/>
+                <a:endParaRPr lang="he-IL" sz="4800" dirty="0"/>
+              </a:p>
+            </p:txBody>
+          </p:sp>
+        </p:grpSp>
+        <p:cxnSp>
+          <p:nvCxnSpPr>
+            <p:cNvPr id="9" name="Straight Connector 8"/>
+            <p:cNvCxnSpPr/>
+            <p:nvPr/>
+          </p:nvCxnSpPr>
+          <p:spPr>
+            <a:xfrm>
+              <a:off x="4779818" y="1925836"/>
+              <a:ext cx="0" cy="1454885"/>
+            </a:xfrm>
+            <a:prstGeom prst="line">
+              <a:avLst/>
+            </a:prstGeom>
+          </p:spPr>
+          <p:style>
+            <a:lnRef idx="1">
+              <a:schemeClr val="dk1"/>
+            </a:lnRef>
+            <a:fillRef idx="0">
+              <a:schemeClr val="dk1"/>
+            </a:fillRef>
+            <a:effectRef idx="0">
+              <a:schemeClr val="dk1"/>
+            </a:effectRef>
+            <a:fontRef idx="minor">
+              <a:schemeClr val="tx1"/>
+            </a:fontRef>
+          </p:style>
+        </p:cxnSp>
+        <p:cxnSp>
+          <p:nvCxnSpPr>
+            <p:cNvPr id="10" name="Straight Connector 9"/>
+            <p:cNvCxnSpPr/>
+            <p:nvPr/>
+          </p:nvCxnSpPr>
+          <p:spPr>
+            <a:xfrm>
+              <a:off x="7715986" y="1927367"/>
+              <a:ext cx="0" cy="1454885"/>
+            </a:xfrm>
+            <a:prstGeom prst="line">
+              <a:avLst/>
+            </a:prstGeom>
+          </p:spPr>
+          <p:style>
+            <a:lnRef idx="1">
+              <a:schemeClr val="dk1"/>
+            </a:lnRef>
+            <a:fillRef idx="0">
+              <a:schemeClr val="dk1"/>
+            </a:fillRef>
+            <a:effectRef idx="0">
+              <a:schemeClr val="dk1"/>
+            </a:effectRef>
+            <a:fontRef idx="minor">
+              <a:schemeClr val="tx1"/>
+            </a:fontRef>
+          </p:style>
+        </p:cxnSp>
+      </p:grpSp>
     </p:spTree>
     <p:extLst>
       <p:ext uri="{BB962C8B-B14F-4D97-AF65-F5344CB8AC3E}">
@@ -3308,12 +3992,12 @@
           <a:p>
             <a:pPr algn="l" rtl="0"/>
             <a:r>
-              <a:rPr lang="pt-BR" dirty="0" smtClean="0">
+              <a:rPr lang="en-US" dirty="0" smtClean="0">
                 <a:solidFill>
                   <a:schemeClr val="bg1"/>
                 </a:solidFill>
               </a:rPr>
-              <a:t>3 ; Obstacle ; E,1 ; wrong ; E,1.5 ; correct ; C</a:t>
+              <a:t>3 ; correct ; D,1 ; Obstacle ; E,1 ; correct ; A,0 ; wrong ; C</a:t>
             </a:r>
             <a:endParaRPr lang="he-IL" dirty="0">
               <a:solidFill>
@@ -3341,7 +4025,7 @@
         </p:blipFill>
         <p:spPr>
           <a:xfrm>
-            <a:off x="2228144" y="1825625"/>
+            <a:off x="228225" y="1996138"/>
             <a:ext cx="7735712" cy="4351338"/>
           </a:xfrm>
           <a:prstGeom prst="rect">
@@ -3349,6 +4033,29 @@
           </a:prstGeom>
         </p:spPr>
       </p:pic>
+      <p:pic>
+        <p:nvPicPr>
+          <p:cNvPr id="5" name="Picture 4"/>
+          <p:cNvPicPr>
+            <a:picLocks noChangeAspect="1"/>
+          </p:cNvPicPr>
+          <p:nvPr/>
+        </p:nvPicPr>
+        <p:blipFill rotWithShape="1">
+          <a:blip r:embed="rId3"/>
+          <a:srcRect l="36693" r="-1"/>
+          <a:stretch/>
+        </p:blipFill>
+        <p:spPr>
+          <a:xfrm>
+            <a:off x="3852241" y="1996138"/>
+            <a:ext cx="4901184" cy="4354830"/>
+          </a:xfrm>
+          <a:prstGeom prst="rect">
+            <a:avLst/>
+          </a:prstGeom>
+        </p:spPr>
+      </p:pic>
       <p:sp>
         <p:nvSpPr>
           <p:cNvPr id="7" name="Rectangle 6"/>
@@ -3357,7 +4064,7 @@
         </p:nvSpPr>
         <p:spPr>
           <a:xfrm>
-            <a:off x="2731008" y="4804472"/>
+            <a:off x="1048081" y="4889641"/>
             <a:ext cx="1706880" cy="316167"/>
           </a:xfrm>
           <a:prstGeom prst="rect">
@@ -3401,212 +4108,7 @@
         </p:nvSpPr>
         <p:spPr>
           <a:xfrm>
-            <a:off x="4846320" y="4804471"/>
-            <a:ext cx="883920" cy="316168"/>
-          </a:xfrm>
-          <a:prstGeom prst="rect">
-            <a:avLst/>
-          </a:prstGeom>
-        </p:spPr>
-        <p:style>
-          <a:lnRef idx="2">
-            <a:schemeClr val="accent1">
-              <a:shade val="50000"/>
-            </a:schemeClr>
-          </a:lnRef>
-          <a:fillRef idx="1">
-            <a:schemeClr val="accent1"/>
-          </a:fillRef>
-          <a:effectRef idx="0">
-            <a:schemeClr val="accent1"/>
-          </a:effectRef>
-          <a:fontRef idx="minor">
-            <a:schemeClr val="lt1"/>
-          </a:fontRef>
-        </p:style>
-        <p:txBody>
-          <a:bodyPr rtlCol="1" anchor="ctr"/>
-          <a:lstStyle/>
-          <a:p>
-            <a:pPr algn="ctr"/>
-            <a:r>
-              <a:rPr lang="en-US" dirty="0" smtClean="0"/>
-              <a:t>1.5 sec</a:t>
-            </a:r>
-            <a:endParaRPr lang="he-IL" dirty="0"/>
-          </a:p>
-        </p:txBody>
-      </p:sp>
-    </p:spTree>
-    <p:extLst>
-      <p:ext uri="{BB962C8B-B14F-4D97-AF65-F5344CB8AC3E}">
-        <p14:creationId xmlns:p14="http://schemas.microsoft.com/office/powerpoint/2010/main" val="2680529493"/>
-      </p:ext>
-    </p:extLst>
-  </p:cSld>
-  <p:clrMapOvr>
-    <a:masterClrMapping/>
-  </p:clrMapOvr>
-</p:sld>
-</file>
-
-<file path=ppt/slides/slide4.xml><?xml version="1.0" encoding="utf-8"?>
-<p:sld xmlns:a="http://schemas.openxmlformats.org/drawingml/2006/main" xmlns:r="http://schemas.openxmlformats.org/officeDocument/2006/relationships" xmlns:p="http://schemas.openxmlformats.org/presentationml/2006/main">
-  <p:cSld>
-    <p:spTree>
-      <p:nvGrpSpPr>
-        <p:cNvPr id="1" name=""/>
-        <p:cNvGrpSpPr/>
-        <p:nvPr/>
-      </p:nvGrpSpPr>
-      <p:grpSpPr>
-        <a:xfrm>
-          <a:off x="0" y="0"/>
-          <a:ext cx="0" cy="0"/>
-          <a:chOff x="0" y="0"/>
-          <a:chExt cx="0" cy="0"/>
-        </a:xfrm>
-      </p:grpSpPr>
-      <p:sp>
-        <p:nvSpPr>
-          <p:cNvPr id="4" name="Title 3"/>
-          <p:cNvSpPr>
-            <a:spLocks noGrp="1"/>
-          </p:cNvSpPr>
-          <p:nvPr>
-            <p:ph type="title"/>
-          </p:nvPr>
-        </p:nvSpPr>
-        <p:spPr>
-          <a:solidFill>
-            <a:schemeClr val="accent2"/>
-          </a:solidFill>
-        </p:spPr>
-        <p:txBody>
-          <a:bodyPr vert="horz" lIns="91440" tIns="45720" rIns="91440" bIns="45720" rtlCol="1" anchor="ctr">
-            <a:normAutofit/>
-          </a:bodyPr>
-          <a:lstStyle/>
-          <a:p>
-            <a:pPr algn="l" rtl="0"/>
-            <a:r>
-              <a:rPr lang="en-US" dirty="0" smtClean="0">
-                <a:solidFill>
-                  <a:schemeClr val="bg1"/>
-                </a:solidFill>
-              </a:rPr>
-              <a:t>3 ; correct ; D,1 ; Obstacle ; E,1 ; correct ; A,0 ; wrong ; C</a:t>
-            </a:r>
-            <a:endParaRPr lang="he-IL" dirty="0">
-              <a:solidFill>
-                <a:schemeClr val="bg1"/>
-              </a:solidFill>
-            </a:endParaRPr>
-          </a:p>
-        </p:txBody>
-      </p:sp>
-      <p:pic>
-        <p:nvPicPr>
-          <p:cNvPr id="3" name="Content Placeholder 2"/>
-          <p:cNvPicPr>
-            <a:picLocks noGrp="1" noChangeAspect="1"/>
-          </p:cNvPicPr>
-          <p:nvPr>
-            <p:ph idx="1"/>
-          </p:nvPr>
-        </p:nvPicPr>
-        <p:blipFill>
-          <a:blip r:embed="rId2"/>
-          <a:stretch>
-            <a:fillRect/>
-          </a:stretch>
-        </p:blipFill>
-        <p:spPr>
-          <a:xfrm>
-            <a:off x="2228144" y="1825625"/>
-            <a:ext cx="7735712" cy="4351338"/>
-          </a:xfrm>
-          <a:prstGeom prst="rect">
-            <a:avLst/>
-          </a:prstGeom>
-        </p:spPr>
-      </p:pic>
-      <p:pic>
-        <p:nvPicPr>
-          <p:cNvPr id="5" name="Picture 4"/>
-          <p:cNvPicPr>
-            <a:picLocks noChangeAspect="1"/>
-          </p:cNvPicPr>
-          <p:nvPr/>
-        </p:nvPicPr>
-        <p:blipFill rotWithShape="1">
-          <a:blip r:embed="rId3"/>
-          <a:srcRect l="36693" r="-1"/>
-          <a:stretch/>
-        </p:blipFill>
-        <p:spPr>
-          <a:xfrm>
-            <a:off x="5852160" y="1825625"/>
-            <a:ext cx="4901184" cy="4354830"/>
-          </a:xfrm>
-          <a:prstGeom prst="rect">
-            <a:avLst/>
-          </a:prstGeom>
-        </p:spPr>
-      </p:pic>
-      <p:sp>
-        <p:nvSpPr>
-          <p:cNvPr id="7" name="Rectangle 6"/>
-          <p:cNvSpPr/>
-          <p:nvPr/>
-        </p:nvSpPr>
-        <p:spPr>
-          <a:xfrm>
-            <a:off x="3048000" y="4719128"/>
-            <a:ext cx="1706880" cy="316167"/>
-          </a:xfrm>
-          <a:prstGeom prst="rect">
-            <a:avLst/>
-          </a:prstGeom>
-        </p:spPr>
-        <p:style>
-          <a:lnRef idx="2">
-            <a:schemeClr val="accent1">
-              <a:shade val="50000"/>
-            </a:schemeClr>
-          </a:lnRef>
-          <a:fillRef idx="1">
-            <a:schemeClr val="accent1"/>
-          </a:fillRef>
-          <a:effectRef idx="0">
-            <a:schemeClr val="accent1"/>
-          </a:effectRef>
-          <a:fontRef idx="minor">
-            <a:schemeClr val="lt1"/>
-          </a:fontRef>
-        </p:style>
-        <p:txBody>
-          <a:bodyPr rtlCol="1" anchor="ctr"/>
-          <a:lstStyle/>
-          <a:p>
-            <a:pPr algn="ctr"/>
-            <a:r>
-              <a:rPr lang="en-US" dirty="0" smtClean="0"/>
-              <a:t>1 sec</a:t>
-            </a:r>
-            <a:endParaRPr lang="he-IL" dirty="0"/>
-          </a:p>
-        </p:txBody>
-      </p:sp>
-      <p:sp>
-        <p:nvSpPr>
-          <p:cNvPr id="8" name="Rectangle 7"/>
-          <p:cNvSpPr/>
-          <p:nvPr/>
-        </p:nvSpPr>
-        <p:spPr>
-          <a:xfrm>
-            <a:off x="4998720" y="4001295"/>
+            <a:off x="2998801" y="4171808"/>
             <a:ext cx="682752" cy="314674"/>
           </a:xfrm>
           <a:prstGeom prst="rect">
@@ -3650,7 +4152,7 @@
         </p:nvSpPr>
         <p:spPr>
           <a:xfrm>
-            <a:off x="5852160" y="4453222"/>
+            <a:off x="3852241" y="4623735"/>
             <a:ext cx="548640" cy="531812"/>
           </a:xfrm>
           <a:prstGeom prst="rect">
@@ -3686,6 +4188,406 @@
           </a:p>
         </p:txBody>
       </p:sp>
+      <p:grpSp>
+        <p:nvGrpSpPr>
+          <p:cNvPr id="10" name="Group 9"/>
+          <p:cNvGrpSpPr/>
+          <p:nvPr/>
+        </p:nvGrpSpPr>
+        <p:grpSpPr>
+          <a:xfrm>
+            <a:off x="8929639" y="3251847"/>
+            <a:ext cx="3062082" cy="1465133"/>
+            <a:chOff x="4653904" y="1925836"/>
+            <a:chExt cx="3062082" cy="1465133"/>
+          </a:xfrm>
+        </p:grpSpPr>
+        <p:grpSp>
+          <p:nvGrpSpPr>
+            <p:cNvPr id="11" name="Group 10"/>
+            <p:cNvGrpSpPr/>
+            <p:nvPr/>
+          </p:nvGrpSpPr>
+          <p:grpSpPr>
+            <a:xfrm>
+              <a:off x="4653904" y="1969300"/>
+              <a:ext cx="3062082" cy="1421669"/>
+              <a:chOff x="-17091" y="1117372"/>
+              <a:chExt cx="12192000" cy="5660528"/>
+            </a:xfrm>
+          </p:grpSpPr>
+          <p:cxnSp>
+            <p:nvCxnSpPr>
+              <p:cNvPr id="14" name="Straight Connector 13"/>
+              <p:cNvCxnSpPr/>
+              <p:nvPr/>
+            </p:nvCxnSpPr>
+            <p:spPr>
+              <a:xfrm flipH="1">
+                <a:off x="-17091" y="3639408"/>
+                <a:ext cx="12192000" cy="0"/>
+              </a:xfrm>
+              <a:prstGeom prst="line">
+                <a:avLst/>
+              </a:prstGeom>
+            </p:spPr>
+            <p:style>
+              <a:lnRef idx="1">
+                <a:schemeClr val="accent1"/>
+              </a:lnRef>
+              <a:fillRef idx="0">
+                <a:schemeClr val="accent1"/>
+              </a:fillRef>
+              <a:effectRef idx="0">
+                <a:schemeClr val="accent1"/>
+              </a:effectRef>
+              <a:fontRef idx="minor">
+                <a:schemeClr val="tx1"/>
+              </a:fontRef>
+            </p:style>
+          </p:cxnSp>
+          <p:cxnSp>
+            <p:nvCxnSpPr>
+              <p:cNvPr id="15" name="Straight Connector 14"/>
+              <p:cNvCxnSpPr/>
+              <p:nvPr/>
+            </p:nvCxnSpPr>
+            <p:spPr>
+              <a:xfrm flipH="1">
+                <a:off x="-17091" y="1452791"/>
+                <a:ext cx="12192000" cy="0"/>
+              </a:xfrm>
+              <a:prstGeom prst="line">
+                <a:avLst/>
+              </a:prstGeom>
+            </p:spPr>
+            <p:style>
+              <a:lnRef idx="1">
+                <a:schemeClr val="accent1"/>
+              </a:lnRef>
+              <a:fillRef idx="0">
+                <a:schemeClr val="accent1"/>
+              </a:fillRef>
+              <a:effectRef idx="0">
+                <a:schemeClr val="accent1"/>
+              </a:effectRef>
+              <a:fontRef idx="minor">
+                <a:schemeClr val="tx1"/>
+              </a:fontRef>
+            </p:style>
+          </p:cxnSp>
+          <p:cxnSp>
+            <p:nvCxnSpPr>
+              <p:cNvPr id="16" name="Straight Connector 15"/>
+              <p:cNvCxnSpPr/>
+              <p:nvPr/>
+            </p:nvCxnSpPr>
+            <p:spPr>
+              <a:xfrm flipH="1">
+                <a:off x="-17091" y="2521518"/>
+                <a:ext cx="12192000" cy="0"/>
+              </a:xfrm>
+              <a:prstGeom prst="line">
+                <a:avLst/>
+              </a:prstGeom>
+            </p:spPr>
+            <p:style>
+              <a:lnRef idx="1">
+                <a:schemeClr val="accent1"/>
+              </a:lnRef>
+              <a:fillRef idx="0">
+                <a:schemeClr val="accent1"/>
+              </a:fillRef>
+              <a:effectRef idx="0">
+                <a:schemeClr val="accent1"/>
+              </a:effectRef>
+              <a:fontRef idx="minor">
+                <a:schemeClr val="tx1"/>
+              </a:fontRef>
+            </p:style>
+          </p:cxnSp>
+          <p:cxnSp>
+            <p:nvCxnSpPr>
+              <p:cNvPr id="17" name="Straight Connector 16"/>
+              <p:cNvCxnSpPr/>
+              <p:nvPr/>
+            </p:nvCxnSpPr>
+            <p:spPr>
+              <a:xfrm flipH="1">
+                <a:off x="-17091" y="4973836"/>
+                <a:ext cx="12192000" cy="0"/>
+              </a:xfrm>
+              <a:prstGeom prst="line">
+                <a:avLst/>
+              </a:prstGeom>
+            </p:spPr>
+            <p:style>
+              <a:lnRef idx="1">
+                <a:schemeClr val="accent1"/>
+              </a:lnRef>
+              <a:fillRef idx="0">
+                <a:schemeClr val="accent1"/>
+              </a:fillRef>
+              <a:effectRef idx="0">
+                <a:schemeClr val="accent1"/>
+              </a:effectRef>
+              <a:fontRef idx="minor">
+                <a:schemeClr val="tx1"/>
+              </a:fontRef>
+            </p:style>
+          </p:cxnSp>
+          <p:cxnSp>
+            <p:nvCxnSpPr>
+              <p:cNvPr id="18" name="Straight Connector 17"/>
+              <p:cNvCxnSpPr/>
+              <p:nvPr/>
+            </p:nvCxnSpPr>
+            <p:spPr>
+              <a:xfrm flipH="1">
+                <a:off x="-17091" y="5986328"/>
+                <a:ext cx="12192000" cy="0"/>
+              </a:xfrm>
+              <a:prstGeom prst="line">
+                <a:avLst/>
+              </a:prstGeom>
+            </p:spPr>
+            <p:style>
+              <a:lnRef idx="1">
+                <a:schemeClr val="accent1"/>
+              </a:lnRef>
+              <a:fillRef idx="0">
+                <a:schemeClr val="accent1"/>
+              </a:fillRef>
+              <a:effectRef idx="0">
+                <a:schemeClr val="accent1"/>
+              </a:effectRef>
+              <a:fontRef idx="minor">
+                <a:schemeClr val="tx1"/>
+              </a:fontRef>
+            </p:style>
+          </p:cxnSp>
+          <p:sp>
+            <p:nvSpPr>
+              <p:cNvPr id="19" name="Oval 18"/>
+              <p:cNvSpPr/>
+              <p:nvPr/>
+            </p:nvSpPr>
+            <p:spPr>
+              <a:xfrm>
+                <a:off x="6831731" y="5194757"/>
+                <a:ext cx="653704" cy="1583143"/>
+              </a:xfrm>
+              <a:prstGeom prst="ellipse">
+                <a:avLst/>
+              </a:prstGeom>
+            </p:spPr>
+            <p:style>
+              <a:lnRef idx="2">
+                <a:schemeClr val="accent2">
+                  <a:shade val="50000"/>
+                </a:schemeClr>
+              </a:lnRef>
+              <a:fillRef idx="1">
+                <a:schemeClr val="accent2"/>
+              </a:fillRef>
+              <a:effectRef idx="0">
+                <a:schemeClr val="accent2"/>
+              </a:effectRef>
+              <a:fontRef idx="minor">
+                <a:schemeClr val="lt1"/>
+              </a:fontRef>
+            </p:style>
+            <p:txBody>
+              <a:bodyPr rtlCol="1" anchor="ctr"/>
+              <a:lstStyle/>
+              <a:p>
+                <a:pPr algn="ctr"/>
+                <a:endParaRPr lang="he-IL"/>
+              </a:p>
+            </p:txBody>
+          </p:sp>
+          <p:sp>
+            <p:nvSpPr>
+              <p:cNvPr id="20" name="Oval 19"/>
+              <p:cNvSpPr/>
+              <p:nvPr/>
+            </p:nvSpPr>
+            <p:spPr>
+              <a:xfrm>
+                <a:off x="3970769" y="4607235"/>
+                <a:ext cx="1273321" cy="640935"/>
+              </a:xfrm>
+              <a:prstGeom prst="ellipse">
+                <a:avLst/>
+              </a:prstGeom>
+            </p:spPr>
+            <p:style>
+              <a:lnRef idx="2">
+                <a:schemeClr val="accent6">
+                  <a:shade val="50000"/>
+                </a:schemeClr>
+              </a:lnRef>
+              <a:fillRef idx="1">
+                <a:schemeClr val="accent6"/>
+              </a:fillRef>
+              <a:effectRef idx="0">
+                <a:schemeClr val="accent6"/>
+              </a:effectRef>
+              <a:fontRef idx="minor">
+                <a:schemeClr val="lt1"/>
+              </a:fontRef>
+            </p:style>
+            <p:txBody>
+              <a:bodyPr rtlCol="1" anchor="ctr"/>
+              <a:lstStyle/>
+              <a:p>
+                <a:pPr algn="ctr"/>
+                <a:endParaRPr lang="he-IL" sz="4800" dirty="0"/>
+              </a:p>
+            </p:txBody>
+          </p:sp>
+          <p:sp>
+            <p:nvSpPr>
+              <p:cNvPr id="21" name="Oval 20"/>
+              <p:cNvSpPr/>
+              <p:nvPr/>
+            </p:nvSpPr>
+            <p:spPr>
+              <a:xfrm>
+                <a:off x="9222939" y="1117372"/>
+                <a:ext cx="1273321" cy="640935"/>
+              </a:xfrm>
+              <a:prstGeom prst="ellipse">
+                <a:avLst/>
+              </a:prstGeom>
+            </p:spPr>
+            <p:style>
+              <a:lnRef idx="2">
+                <a:schemeClr val="accent6">
+                  <a:shade val="50000"/>
+                </a:schemeClr>
+              </a:lnRef>
+              <a:fillRef idx="1">
+                <a:schemeClr val="accent6"/>
+              </a:fillRef>
+              <a:effectRef idx="0">
+                <a:schemeClr val="accent6"/>
+              </a:effectRef>
+              <a:fontRef idx="minor">
+                <a:schemeClr val="lt1"/>
+              </a:fontRef>
+            </p:style>
+            <p:txBody>
+              <a:bodyPr rtlCol="1" anchor="ctr"/>
+              <a:lstStyle/>
+              <a:p>
+                <a:pPr algn="ctr"/>
+                <a:endParaRPr lang="he-IL" sz="4800" dirty="0"/>
+              </a:p>
+            </p:txBody>
+          </p:sp>
+          <p:sp>
+            <p:nvSpPr>
+              <p:cNvPr id="22" name="Oval 21"/>
+              <p:cNvSpPr/>
+              <p:nvPr/>
+            </p:nvSpPr>
+            <p:spPr>
+              <a:xfrm>
+                <a:off x="9217923" y="3259349"/>
+                <a:ext cx="1273321" cy="640935"/>
+              </a:xfrm>
+              <a:prstGeom prst="ellipse">
+                <a:avLst/>
+              </a:prstGeom>
+            </p:spPr>
+            <p:style>
+              <a:lnRef idx="2">
+                <a:schemeClr val="accent4">
+                  <a:shade val="50000"/>
+                </a:schemeClr>
+              </a:lnRef>
+              <a:fillRef idx="1">
+                <a:schemeClr val="accent4"/>
+              </a:fillRef>
+              <a:effectRef idx="0">
+                <a:schemeClr val="accent4"/>
+              </a:effectRef>
+              <a:fontRef idx="minor">
+                <a:schemeClr val="lt1"/>
+              </a:fontRef>
+            </p:style>
+            <p:txBody>
+              <a:bodyPr rtlCol="1" anchor="ctr"/>
+              <a:lstStyle/>
+              <a:p>
+                <a:pPr algn="ctr"/>
+                <a:endParaRPr lang="he-IL" sz="4800" dirty="0"/>
+              </a:p>
+            </p:txBody>
+          </p:sp>
+        </p:grpSp>
+        <p:cxnSp>
+          <p:nvCxnSpPr>
+            <p:cNvPr id="12" name="Straight Connector 11"/>
+            <p:cNvCxnSpPr/>
+            <p:nvPr/>
+          </p:nvCxnSpPr>
+          <p:spPr>
+            <a:xfrm>
+              <a:off x="4779818" y="1925836"/>
+              <a:ext cx="0" cy="1454885"/>
+            </a:xfrm>
+            <a:prstGeom prst="line">
+              <a:avLst/>
+            </a:prstGeom>
+          </p:spPr>
+          <p:style>
+            <a:lnRef idx="1">
+              <a:schemeClr val="dk1"/>
+            </a:lnRef>
+            <a:fillRef idx="0">
+              <a:schemeClr val="dk1"/>
+            </a:fillRef>
+            <a:effectRef idx="0">
+              <a:schemeClr val="dk1"/>
+            </a:effectRef>
+            <a:fontRef idx="minor">
+              <a:schemeClr val="tx1"/>
+            </a:fontRef>
+          </p:style>
+        </p:cxnSp>
+        <p:cxnSp>
+          <p:nvCxnSpPr>
+            <p:cNvPr id="13" name="Straight Connector 12"/>
+            <p:cNvCxnSpPr/>
+            <p:nvPr/>
+          </p:nvCxnSpPr>
+          <p:spPr>
+            <a:xfrm>
+              <a:off x="7715986" y="1927367"/>
+              <a:ext cx="0" cy="1454885"/>
+            </a:xfrm>
+            <a:prstGeom prst="line">
+              <a:avLst/>
+            </a:prstGeom>
+          </p:spPr>
+          <p:style>
+            <a:lnRef idx="1">
+              <a:schemeClr val="dk1"/>
+            </a:lnRef>
+            <a:fillRef idx="0">
+              <a:schemeClr val="dk1"/>
+            </a:fillRef>
+            <a:effectRef idx="0">
+              <a:schemeClr val="dk1"/>
+            </a:effectRef>
+            <a:fontRef idx="minor">
+              <a:schemeClr val="tx1"/>
+            </a:fontRef>
+          </p:style>
+        </p:cxnSp>
+      </p:grpSp>
     </p:spTree>
     <p:extLst>
       <p:ext uri="{BB962C8B-B14F-4D97-AF65-F5344CB8AC3E}">

</xml_diff>